<commit_message>
completed the product powerpoint slides
</commit_message>
<xml_diff>
--- a/PowerPoints/Phase 2 - Overview/005 An Overview of Product Data.pptx
+++ b/PowerPoints/Phase 2 - Overview/005 An Overview of Product Data.pptx
@@ -109,6 +109,22 @@
       </a:defRPr>
     </a:lvl9pPr>
   </p:defaultTextStyle>
+  <p:extLst>
+    <p:ext uri="{EFAFB233-063F-42B5-8137-9DF3F51BA10A}">
+      <p15:sldGuideLst xmlns:p15="http://schemas.microsoft.com/office/powerpoint/2012/main">
+        <p15:guide id="1" orient="horz" pos="2160">
+          <p15:clr>
+            <a:srgbClr val="A4A3A4"/>
+          </p15:clr>
+        </p15:guide>
+        <p15:guide id="2" pos="3840">
+          <p15:clr>
+            <a:srgbClr val="A4A3A4"/>
+          </p15:clr>
+        </p15:guide>
+      </p15:sldGuideLst>
+    </p:ext>
+  </p:extLst>
 </p:presentation>
 </file>
 
@@ -156,7 +172,7 @@
           </a:lstStyle>
           <a:p>
             <a:r>
-              <a:rPr lang="en-US" smtClean="0"/>
+              <a:rPr lang="en-US"/>
               <a:t>Click to edit Master title style</a:t>
             </a:r>
             <a:endParaRPr lang="en-US" dirty="0"/>
@@ -230,7 +246,7 @@
           </a:lstStyle>
           <a:p>
             <a:r>
-              <a:rPr lang="en-US" smtClean="0"/>
+              <a:rPr lang="en-US"/>
               <a:t>Click to edit Master subtitle style</a:t>
             </a:r>
             <a:endParaRPr lang="en-US" dirty="0"/>
@@ -254,7 +270,7 @@
           <a:p>
             <a:fld id="{FF632088-7E42-4B13-8645-6CA4616862AF}" type="datetimeFigureOut">
               <a:rPr lang="en-US" smtClean="0"/>
-              <a:t>2/23/2016</a:t>
+              <a:t>2/28/2016</a:t>
             </a:fld>
             <a:endParaRPr lang="en-US"/>
           </a:p>
@@ -348,10 +364,9 @@
           <a:lstStyle/>
           <a:p>
             <a:r>
-              <a:rPr lang="en-US" smtClean="0"/>
+              <a:rPr lang="en-US"/>
               <a:t>Click to edit Master title style</a:t>
             </a:r>
-            <a:endParaRPr lang="en-US"/>
           </a:p>
         </p:txBody>
       </p:sp>
@@ -372,35 +387,35 @@
           <a:p>
             <a:pPr lvl="0"/>
             <a:r>
-              <a:rPr lang="en-US" smtClean="0"/>
+              <a:rPr lang="en-US"/>
               <a:t>Edit Master text styles</a:t>
             </a:r>
           </a:p>
           <a:p>
             <a:pPr lvl="1"/>
             <a:r>
-              <a:rPr lang="en-US" smtClean="0"/>
+              <a:rPr lang="en-US"/>
               <a:t>Second level</a:t>
             </a:r>
           </a:p>
           <a:p>
             <a:pPr lvl="2"/>
             <a:r>
-              <a:rPr lang="en-US" smtClean="0"/>
+              <a:rPr lang="en-US"/>
               <a:t>Third level</a:t>
             </a:r>
           </a:p>
           <a:p>
             <a:pPr lvl="3"/>
             <a:r>
-              <a:rPr lang="en-US" smtClean="0"/>
+              <a:rPr lang="en-US"/>
               <a:t>Fourth level</a:t>
             </a:r>
           </a:p>
           <a:p>
             <a:pPr lvl="4"/>
             <a:r>
-              <a:rPr lang="en-US" smtClean="0"/>
+              <a:rPr lang="en-US"/>
               <a:t>Fifth level</a:t>
             </a:r>
             <a:endParaRPr lang="en-US" dirty="0"/>
@@ -424,7 +439,7 @@
           <a:p>
             <a:fld id="{FF632088-7E42-4B13-8645-6CA4616862AF}" type="datetimeFigureOut">
               <a:rPr lang="en-US" smtClean="0"/>
-              <a:t>2/23/2016</a:t>
+              <a:t>2/28/2016</a:t>
             </a:fld>
             <a:endParaRPr lang="en-US"/>
           </a:p>
@@ -523,10 +538,9 @@
           <a:lstStyle/>
           <a:p>
             <a:r>
-              <a:rPr lang="en-US" smtClean="0"/>
+              <a:rPr lang="en-US"/>
               <a:t>Click to edit Master title style</a:t>
             </a:r>
-            <a:endParaRPr lang="en-US"/>
           </a:p>
         </p:txBody>
       </p:sp>
@@ -552,38 +566,37 @@
           <a:p>
             <a:pPr lvl="0"/>
             <a:r>
-              <a:rPr lang="en-US" smtClean="0"/>
+              <a:rPr lang="en-US"/>
               <a:t>Edit Master text styles</a:t>
             </a:r>
           </a:p>
           <a:p>
             <a:pPr lvl="1"/>
             <a:r>
-              <a:rPr lang="en-US" smtClean="0"/>
+              <a:rPr lang="en-US"/>
               <a:t>Second level</a:t>
             </a:r>
           </a:p>
           <a:p>
             <a:pPr lvl="2"/>
             <a:r>
-              <a:rPr lang="en-US" smtClean="0"/>
+              <a:rPr lang="en-US"/>
               <a:t>Third level</a:t>
             </a:r>
           </a:p>
           <a:p>
             <a:pPr lvl="3"/>
             <a:r>
-              <a:rPr lang="en-US" smtClean="0"/>
+              <a:rPr lang="en-US"/>
               <a:t>Fourth level</a:t>
             </a:r>
           </a:p>
           <a:p>
             <a:pPr lvl="4"/>
             <a:r>
-              <a:rPr lang="en-US" smtClean="0"/>
+              <a:rPr lang="en-US"/>
               <a:t>Fifth level</a:t>
             </a:r>
-            <a:endParaRPr lang="en-US"/>
           </a:p>
         </p:txBody>
       </p:sp>
@@ -604,7 +617,7 @@
           <a:p>
             <a:fld id="{FF632088-7E42-4B13-8645-6CA4616862AF}" type="datetimeFigureOut">
               <a:rPr lang="en-US" smtClean="0"/>
-              <a:t>2/23/2016</a:t>
+              <a:t>2/28/2016</a:t>
             </a:fld>
             <a:endParaRPr lang="en-US"/>
           </a:p>
@@ -709,7 +722,7 @@
           </a:lstStyle>
           <a:p>
             <a:r>
-              <a:rPr lang="en-US" smtClean="0"/>
+              <a:rPr lang="en-US"/>
               <a:t>Click to edit Master title style</a:t>
             </a:r>
             <a:endParaRPr lang="en-US" dirty="0"/>
@@ -780,7 +793,7 @@
           </a:lstStyle>
           <a:p>
             <a:r>
-              <a:rPr lang="en-US" smtClean="0"/>
+              <a:rPr lang="en-US"/>
               <a:t>Click to edit Master subtitle style</a:t>
             </a:r>
             <a:endParaRPr lang="en-US" dirty="0"/>
@@ -804,7 +817,7 @@
           <a:p>
             <a:fld id="{FF632088-7E42-4B13-8645-6CA4616862AF}" type="datetimeFigureOut">
               <a:rPr lang="en-US" smtClean="0"/>
-              <a:t>2/23/2016</a:t>
+              <a:t>2/28/2016</a:t>
             </a:fld>
             <a:endParaRPr lang="en-US"/>
           </a:p>
@@ -945,7 +958,7 @@
           <a:lstStyle/>
           <a:p>
             <a:r>
-              <a:rPr lang="en-US" smtClean="0"/>
+              <a:rPr lang="en-US"/>
               <a:t>Click to edit Master title style</a:t>
             </a:r>
             <a:endParaRPr lang="en-US" dirty="0"/>
@@ -969,35 +982,35 @@
           <a:p>
             <a:pPr lvl="0"/>
             <a:r>
-              <a:rPr lang="en-US" smtClean="0"/>
+              <a:rPr lang="en-US"/>
               <a:t>Edit Master text styles</a:t>
             </a:r>
           </a:p>
           <a:p>
             <a:pPr lvl="1"/>
             <a:r>
-              <a:rPr lang="en-US" smtClean="0"/>
+              <a:rPr lang="en-US"/>
               <a:t>Second level</a:t>
             </a:r>
           </a:p>
           <a:p>
             <a:pPr lvl="2"/>
             <a:r>
-              <a:rPr lang="en-US" smtClean="0"/>
+              <a:rPr lang="en-US"/>
               <a:t>Third level</a:t>
             </a:r>
           </a:p>
           <a:p>
             <a:pPr lvl="3"/>
             <a:r>
-              <a:rPr lang="en-US" smtClean="0"/>
+              <a:rPr lang="en-US"/>
               <a:t>Fourth level</a:t>
             </a:r>
           </a:p>
           <a:p>
             <a:pPr lvl="4"/>
             <a:r>
-              <a:rPr lang="en-US" smtClean="0"/>
+              <a:rPr lang="en-US"/>
               <a:t>Fifth level</a:t>
             </a:r>
             <a:endParaRPr lang="en-US" dirty="0"/>
@@ -1021,7 +1034,7 @@
           <a:p>
             <a:fld id="{FF632088-7E42-4B13-8645-6CA4616862AF}" type="datetimeFigureOut">
               <a:rPr lang="en-US" smtClean="0"/>
-              <a:t>2/23/2016</a:t>
+              <a:t>2/28/2016</a:t>
             </a:fld>
             <a:endParaRPr lang="en-US"/>
           </a:p>
@@ -1163,7 +1176,7 @@
           </a:lstStyle>
           <a:p>
             <a:r>
-              <a:rPr lang="en-US" smtClean="0"/>
+              <a:rPr lang="en-US"/>
               <a:t>Click to edit Master title style</a:t>
             </a:r>
             <a:endParaRPr lang="en-US" dirty="0"/>
@@ -1283,7 +1296,7 @@
           <a:p>
             <a:pPr lvl="0"/>
             <a:r>
-              <a:rPr lang="en-US" smtClean="0"/>
+              <a:rPr lang="en-US"/>
               <a:t>Edit Master text styles</a:t>
             </a:r>
           </a:p>
@@ -1306,7 +1319,7 @@
           <a:p>
             <a:fld id="{FF632088-7E42-4B13-8645-6CA4616862AF}" type="datetimeFigureOut">
               <a:rPr lang="en-US" smtClean="0"/>
-              <a:t>2/23/2016</a:t>
+              <a:t>2/28/2016</a:t>
             </a:fld>
             <a:endParaRPr lang="en-US"/>
           </a:p>
@@ -1442,7 +1455,7 @@
           <a:lstStyle/>
           <a:p>
             <a:r>
-              <a:rPr lang="en-US" smtClean="0"/>
+              <a:rPr lang="en-US"/>
               <a:t>Click to edit Master title style</a:t>
             </a:r>
             <a:endParaRPr lang="en-US" dirty="0"/>
@@ -1471,35 +1484,35 @@
           <a:p>
             <a:pPr lvl="0"/>
             <a:r>
-              <a:rPr lang="en-US" smtClean="0"/>
+              <a:rPr lang="en-US"/>
               <a:t>Edit Master text styles</a:t>
             </a:r>
           </a:p>
           <a:p>
             <a:pPr lvl="1"/>
             <a:r>
-              <a:rPr lang="en-US" smtClean="0"/>
+              <a:rPr lang="en-US"/>
               <a:t>Second level</a:t>
             </a:r>
           </a:p>
           <a:p>
             <a:pPr lvl="2"/>
             <a:r>
-              <a:rPr lang="en-US" smtClean="0"/>
+              <a:rPr lang="en-US"/>
               <a:t>Third level</a:t>
             </a:r>
           </a:p>
           <a:p>
             <a:pPr lvl="3"/>
             <a:r>
-              <a:rPr lang="en-US" smtClean="0"/>
+              <a:rPr lang="en-US"/>
               <a:t>Fourth level</a:t>
             </a:r>
           </a:p>
           <a:p>
             <a:pPr lvl="4"/>
             <a:r>
-              <a:rPr lang="en-US" smtClean="0"/>
+              <a:rPr lang="en-US"/>
               <a:t>Fifth level</a:t>
             </a:r>
             <a:endParaRPr lang="en-US" dirty="0"/>
@@ -1528,35 +1541,35 @@
           <a:p>
             <a:pPr lvl="0"/>
             <a:r>
-              <a:rPr lang="en-US" smtClean="0"/>
+              <a:rPr lang="en-US"/>
               <a:t>Edit Master text styles</a:t>
             </a:r>
           </a:p>
           <a:p>
             <a:pPr lvl="1"/>
             <a:r>
-              <a:rPr lang="en-US" smtClean="0"/>
+              <a:rPr lang="en-US"/>
               <a:t>Second level</a:t>
             </a:r>
           </a:p>
           <a:p>
             <a:pPr lvl="2"/>
             <a:r>
-              <a:rPr lang="en-US" smtClean="0"/>
+              <a:rPr lang="en-US"/>
               <a:t>Third level</a:t>
             </a:r>
           </a:p>
           <a:p>
             <a:pPr lvl="3"/>
             <a:r>
-              <a:rPr lang="en-US" smtClean="0"/>
+              <a:rPr lang="en-US"/>
               <a:t>Fourth level</a:t>
             </a:r>
           </a:p>
           <a:p>
             <a:pPr lvl="4"/>
             <a:r>
-              <a:rPr lang="en-US" smtClean="0"/>
+              <a:rPr lang="en-US"/>
               <a:t>Fifth level</a:t>
             </a:r>
             <a:endParaRPr lang="en-US" dirty="0"/>
@@ -1580,7 +1593,7 @@
           <a:p>
             <a:fld id="{FF632088-7E42-4B13-8645-6CA4616862AF}" type="datetimeFigureOut">
               <a:rPr lang="en-US" smtClean="0"/>
-              <a:t>2/23/2016</a:t>
+              <a:t>2/28/2016</a:t>
             </a:fld>
             <a:endParaRPr lang="en-US"/>
           </a:p>
@@ -1677,7 +1690,7 @@
   </p:clrMapOvr>
   <p:extLst>
     <p:ext uri="{DCECCB84-F9BA-43D5-87BE-67443E8EF086}">
-      <p15:sldGuideLst xmlns="" xmlns:p15="http://schemas.microsoft.com/office/powerpoint/2012/main"/>
+      <p15:sldGuideLst xmlns:p15="http://schemas.microsoft.com/office/powerpoint/2012/main"/>
     </p:ext>
   </p:extLst>
 </p:sldLayout>
@@ -1721,7 +1734,7 @@
           <a:lstStyle/>
           <a:p>
             <a:r>
-              <a:rPr lang="en-US" smtClean="0"/>
+              <a:rPr lang="en-US"/>
               <a:t>Click to edit Master title style</a:t>
             </a:r>
             <a:endParaRPr lang="en-US" dirty="0"/>
@@ -1796,7 +1809,7 @@
           <a:p>
             <a:pPr lvl="0"/>
             <a:r>
-              <a:rPr lang="en-US" smtClean="0"/>
+              <a:rPr lang="en-US"/>
               <a:t>Edit Master text styles</a:t>
             </a:r>
           </a:p>
@@ -1824,35 +1837,35 @@
           <a:p>
             <a:pPr lvl="0"/>
             <a:r>
-              <a:rPr lang="en-US" smtClean="0"/>
+              <a:rPr lang="en-US"/>
               <a:t>Edit Master text styles</a:t>
             </a:r>
           </a:p>
           <a:p>
             <a:pPr lvl="1"/>
             <a:r>
-              <a:rPr lang="en-US" smtClean="0"/>
+              <a:rPr lang="en-US"/>
               <a:t>Second level</a:t>
             </a:r>
           </a:p>
           <a:p>
             <a:pPr lvl="2"/>
             <a:r>
-              <a:rPr lang="en-US" smtClean="0"/>
+              <a:rPr lang="en-US"/>
               <a:t>Third level</a:t>
             </a:r>
           </a:p>
           <a:p>
             <a:pPr lvl="3"/>
             <a:r>
-              <a:rPr lang="en-US" smtClean="0"/>
+              <a:rPr lang="en-US"/>
               <a:t>Fourth level</a:t>
             </a:r>
           </a:p>
           <a:p>
             <a:pPr lvl="4"/>
             <a:r>
-              <a:rPr lang="en-US" smtClean="0"/>
+              <a:rPr lang="en-US"/>
               <a:t>Fifth level</a:t>
             </a:r>
             <a:endParaRPr lang="en-US" dirty="0"/>
@@ -1927,7 +1940,7 @@
           <a:p>
             <a:pPr lvl="0"/>
             <a:r>
-              <a:rPr lang="en-US" smtClean="0"/>
+              <a:rPr lang="en-US"/>
               <a:t>Edit Master text styles</a:t>
             </a:r>
           </a:p>
@@ -1955,35 +1968,35 @@
           <a:p>
             <a:pPr lvl="0"/>
             <a:r>
-              <a:rPr lang="en-US" smtClean="0"/>
+              <a:rPr lang="en-US"/>
               <a:t>Edit Master text styles</a:t>
             </a:r>
           </a:p>
           <a:p>
             <a:pPr lvl="1"/>
             <a:r>
-              <a:rPr lang="en-US" smtClean="0"/>
+              <a:rPr lang="en-US"/>
               <a:t>Second level</a:t>
             </a:r>
           </a:p>
           <a:p>
             <a:pPr lvl="2"/>
             <a:r>
-              <a:rPr lang="en-US" smtClean="0"/>
+              <a:rPr lang="en-US"/>
               <a:t>Third level</a:t>
             </a:r>
           </a:p>
           <a:p>
             <a:pPr lvl="3"/>
             <a:r>
-              <a:rPr lang="en-US" smtClean="0"/>
+              <a:rPr lang="en-US"/>
               <a:t>Fourth level</a:t>
             </a:r>
           </a:p>
           <a:p>
             <a:pPr lvl="4"/>
             <a:r>
-              <a:rPr lang="en-US" smtClean="0"/>
+              <a:rPr lang="en-US"/>
               <a:t>Fifth level</a:t>
             </a:r>
             <a:endParaRPr lang="en-US" dirty="0"/>
@@ -2007,7 +2020,7 @@
           <a:p>
             <a:fld id="{FF632088-7E42-4B13-8645-6CA4616862AF}" type="datetimeFigureOut">
               <a:rPr lang="en-US" smtClean="0"/>
-              <a:t>2/23/2016</a:t>
+              <a:t>2/28/2016</a:t>
             </a:fld>
             <a:endParaRPr lang="en-US"/>
           </a:p>
@@ -2104,7 +2117,7 @@
   </p:clrMapOvr>
   <p:extLst>
     <p:ext uri="{DCECCB84-F9BA-43D5-87BE-67443E8EF086}">
-      <p15:sldGuideLst xmlns="" xmlns:p15="http://schemas.microsoft.com/office/powerpoint/2012/main"/>
+      <p15:sldGuideLst xmlns:p15="http://schemas.microsoft.com/office/powerpoint/2012/main"/>
     </p:ext>
   </p:extLst>
 </p:sldLayout>
@@ -2143,7 +2156,7 @@
           <a:lstStyle/>
           <a:p>
             <a:r>
-              <a:rPr lang="en-US" smtClean="0"/>
+              <a:rPr lang="en-US"/>
               <a:t>Click to edit Master title style</a:t>
             </a:r>
             <a:endParaRPr lang="en-US" dirty="0"/>
@@ -2167,7 +2180,7 @@
           <a:p>
             <a:fld id="{FF632088-7E42-4B13-8645-6CA4616862AF}" type="datetimeFigureOut">
               <a:rPr lang="en-US" smtClean="0"/>
-              <a:t>2/23/2016</a:t>
+              <a:t>2/28/2016</a:t>
             </a:fld>
             <a:endParaRPr lang="en-US"/>
           </a:p>
@@ -2299,7 +2312,7 @@
           <a:p>
             <a:fld id="{FF632088-7E42-4B13-8645-6CA4616862AF}" type="datetimeFigureOut">
               <a:rPr lang="en-US" smtClean="0"/>
-              <a:t>2/23/2016</a:t>
+              <a:t>2/28/2016</a:t>
             </a:fld>
             <a:endParaRPr lang="en-US"/>
           </a:p>
@@ -2404,7 +2417,7 @@
           </a:lstStyle>
           <a:p>
             <a:r>
-              <a:rPr lang="en-US" smtClean="0"/>
+              <a:rPr lang="en-US"/>
               <a:t>Click to edit Master title style</a:t>
             </a:r>
             <a:endParaRPr lang="en-US" dirty="0"/>
@@ -2433,35 +2446,35 @@
           <a:p>
             <a:pPr lvl="0"/>
             <a:r>
-              <a:rPr lang="en-US" smtClean="0"/>
+              <a:rPr lang="en-US"/>
               <a:t>Edit Master text styles</a:t>
             </a:r>
           </a:p>
           <a:p>
             <a:pPr lvl="1"/>
             <a:r>
-              <a:rPr lang="en-US" smtClean="0"/>
+              <a:rPr lang="en-US"/>
               <a:t>Second level</a:t>
             </a:r>
           </a:p>
           <a:p>
             <a:pPr lvl="2"/>
             <a:r>
-              <a:rPr lang="en-US" smtClean="0"/>
+              <a:rPr lang="en-US"/>
               <a:t>Third level</a:t>
             </a:r>
           </a:p>
           <a:p>
             <a:pPr lvl="3"/>
             <a:r>
-              <a:rPr lang="en-US" smtClean="0"/>
+              <a:rPr lang="en-US"/>
               <a:t>Fourth level</a:t>
             </a:r>
           </a:p>
           <a:p>
             <a:pPr lvl="4"/>
             <a:r>
-              <a:rPr lang="en-US" smtClean="0"/>
+              <a:rPr lang="en-US"/>
               <a:t>Fifth level</a:t>
             </a:r>
             <a:endParaRPr lang="en-US" dirty="0"/>
@@ -2527,7 +2540,7 @@
           <a:p>
             <a:pPr lvl="0"/>
             <a:r>
-              <a:rPr lang="en-US" smtClean="0"/>
+              <a:rPr lang="en-US"/>
               <a:t>Edit Master text styles</a:t>
             </a:r>
           </a:p>
@@ -2550,7 +2563,7 @@
           <a:p>
             <a:fld id="{FF632088-7E42-4B13-8645-6CA4616862AF}" type="datetimeFigureOut">
               <a:rPr lang="en-US" smtClean="0"/>
-              <a:t>2/23/2016</a:t>
+              <a:t>2/28/2016</a:t>
             </a:fld>
             <a:endParaRPr lang="en-US"/>
           </a:p>
@@ -2647,7 +2660,7 @@
   </p:clrMapOvr>
   <p:extLst>
     <p:ext uri="{DCECCB84-F9BA-43D5-87BE-67443E8EF086}">
-      <p15:sldGuideLst xmlns="" xmlns:p15="http://schemas.microsoft.com/office/powerpoint/2012/main"/>
+      <p15:sldGuideLst xmlns:p15="http://schemas.microsoft.com/office/powerpoint/2012/main"/>
     </p:ext>
   </p:extLst>
 </p:sldLayout>
@@ -2686,7 +2699,7 @@
           <a:lstStyle/>
           <a:p>
             <a:r>
-              <a:rPr lang="en-US" smtClean="0"/>
+              <a:rPr lang="en-US"/>
               <a:t>Click to edit Master title style</a:t>
             </a:r>
             <a:endParaRPr lang="en-US" dirty="0"/>
@@ -2710,35 +2723,35 @@
           <a:p>
             <a:pPr lvl="0"/>
             <a:r>
-              <a:rPr lang="en-US" smtClean="0"/>
+              <a:rPr lang="en-US"/>
               <a:t>Edit Master text styles</a:t>
             </a:r>
           </a:p>
           <a:p>
             <a:pPr lvl="1"/>
             <a:r>
-              <a:rPr lang="en-US" smtClean="0"/>
+              <a:rPr lang="en-US"/>
               <a:t>Second level</a:t>
             </a:r>
           </a:p>
           <a:p>
             <a:pPr lvl="2"/>
             <a:r>
-              <a:rPr lang="en-US" smtClean="0"/>
+              <a:rPr lang="en-US"/>
               <a:t>Third level</a:t>
             </a:r>
           </a:p>
           <a:p>
             <a:pPr lvl="3"/>
             <a:r>
-              <a:rPr lang="en-US" smtClean="0"/>
+              <a:rPr lang="en-US"/>
               <a:t>Fourth level</a:t>
             </a:r>
           </a:p>
           <a:p>
             <a:pPr lvl="4"/>
             <a:r>
-              <a:rPr lang="en-US" smtClean="0"/>
+              <a:rPr lang="en-US"/>
               <a:t>Fifth level</a:t>
             </a:r>
             <a:endParaRPr lang="en-US" dirty="0"/>
@@ -2762,7 +2775,7 @@
           <a:p>
             <a:fld id="{FF632088-7E42-4B13-8645-6CA4616862AF}" type="datetimeFigureOut">
               <a:rPr lang="en-US" smtClean="0"/>
-              <a:t>2/23/2016</a:t>
+              <a:t>2/28/2016</a:t>
             </a:fld>
             <a:endParaRPr lang="en-US"/>
           </a:p>
@@ -3005,7 +3018,7 @@
           </a:lstStyle>
           <a:p>
             <a:r>
-              <a:rPr lang="en-US" smtClean="0"/>
+              <a:rPr lang="en-US"/>
               <a:t>Click to edit Master title style</a:t>
             </a:r>
             <a:endParaRPr lang="en-US" dirty="0"/>
@@ -3080,7 +3093,7 @@
           </a:lstStyle>
           <a:p>
             <a:r>
-              <a:rPr lang="en-US" smtClean="0"/>
+              <a:rPr lang="en-US"/>
               <a:t>Click icon to add picture</a:t>
             </a:r>
             <a:endParaRPr lang="en-US" dirty="0"/>
@@ -3148,7 +3161,7 @@
           <a:p>
             <a:pPr lvl="0"/>
             <a:r>
-              <a:rPr lang="en-US" smtClean="0"/>
+              <a:rPr lang="en-US"/>
               <a:t>Edit Master text styles</a:t>
             </a:r>
           </a:p>
@@ -3180,7 +3193,7 @@
           <a:p>
             <a:fld id="{FF632088-7E42-4B13-8645-6CA4616862AF}" type="datetimeFigureOut">
               <a:rPr lang="en-US" smtClean="0"/>
-              <a:t>2/23/2016</a:t>
+              <a:t>2/28/2016</a:t>
             </a:fld>
             <a:endParaRPr lang="en-US"/>
           </a:p>
@@ -3316,7 +3329,7 @@
           <a:lstStyle/>
           <a:p>
             <a:r>
-              <a:rPr lang="en-US" smtClean="0"/>
+              <a:rPr lang="en-US"/>
               <a:t>Click to edit Master title style</a:t>
             </a:r>
             <a:endParaRPr lang="en-US" dirty="0"/>
@@ -3340,35 +3353,35 @@
           <a:p>
             <a:pPr lvl="0"/>
             <a:r>
-              <a:rPr lang="en-US" smtClean="0"/>
+              <a:rPr lang="en-US"/>
               <a:t>Edit Master text styles</a:t>
             </a:r>
           </a:p>
           <a:p>
             <a:pPr lvl="1"/>
             <a:r>
-              <a:rPr lang="en-US" smtClean="0"/>
+              <a:rPr lang="en-US"/>
               <a:t>Second level</a:t>
             </a:r>
           </a:p>
           <a:p>
             <a:pPr lvl="2"/>
             <a:r>
-              <a:rPr lang="en-US" smtClean="0"/>
+              <a:rPr lang="en-US"/>
               <a:t>Third level</a:t>
             </a:r>
           </a:p>
           <a:p>
             <a:pPr lvl="3"/>
             <a:r>
-              <a:rPr lang="en-US" smtClean="0"/>
+              <a:rPr lang="en-US"/>
               <a:t>Fourth level</a:t>
             </a:r>
           </a:p>
           <a:p>
             <a:pPr lvl="4"/>
             <a:r>
-              <a:rPr lang="en-US" smtClean="0"/>
+              <a:rPr lang="en-US"/>
               <a:t>Fifth level</a:t>
             </a:r>
             <a:endParaRPr lang="en-US" dirty="0"/>
@@ -3392,7 +3405,7 @@
           <a:p>
             <a:fld id="{FF632088-7E42-4B13-8645-6CA4616862AF}" type="datetimeFigureOut">
               <a:rPr lang="en-US" smtClean="0"/>
-              <a:t>2/23/2016</a:t>
+              <a:t>2/28/2016</a:t>
             </a:fld>
             <a:endParaRPr lang="en-US"/>
           </a:p>
@@ -3532,7 +3545,7 @@
           </a:lstStyle>
           <a:p>
             <a:r>
-              <a:rPr lang="en-US" smtClean="0"/>
+              <a:rPr lang="en-US"/>
               <a:t>Click to edit Master title style</a:t>
             </a:r>
             <a:endParaRPr lang="en-US" dirty="0"/>
@@ -3561,35 +3574,35 @@
           <a:p>
             <a:pPr lvl="0"/>
             <a:r>
-              <a:rPr lang="en-US" smtClean="0"/>
+              <a:rPr lang="en-US"/>
               <a:t>Edit Master text styles</a:t>
             </a:r>
           </a:p>
           <a:p>
             <a:pPr lvl="1"/>
             <a:r>
-              <a:rPr lang="en-US" smtClean="0"/>
+              <a:rPr lang="en-US"/>
               <a:t>Second level</a:t>
             </a:r>
           </a:p>
           <a:p>
             <a:pPr lvl="2"/>
             <a:r>
-              <a:rPr lang="en-US" smtClean="0"/>
+              <a:rPr lang="en-US"/>
               <a:t>Third level</a:t>
             </a:r>
           </a:p>
           <a:p>
             <a:pPr lvl="3"/>
             <a:r>
-              <a:rPr lang="en-US" smtClean="0"/>
+              <a:rPr lang="en-US"/>
               <a:t>Fourth level</a:t>
             </a:r>
           </a:p>
           <a:p>
             <a:pPr lvl="4"/>
             <a:r>
-              <a:rPr lang="en-US" smtClean="0"/>
+              <a:rPr lang="en-US"/>
               <a:t>Fifth level</a:t>
             </a:r>
             <a:endParaRPr lang="en-US" dirty="0"/>
@@ -3613,7 +3626,7 @@
           <a:p>
             <a:fld id="{FF632088-7E42-4B13-8645-6CA4616862AF}" type="datetimeFigureOut">
               <a:rPr lang="en-US" smtClean="0"/>
-              <a:t>2/23/2016</a:t>
+              <a:t>2/28/2016</a:t>
             </a:fld>
             <a:endParaRPr lang="en-US"/>
           </a:p>
@@ -3755,7 +3768,7 @@
           </a:lstStyle>
           <a:p>
             <a:r>
-              <a:rPr lang="en-US" smtClean="0"/>
+              <a:rPr lang="en-US"/>
               <a:t>Click to edit Master title style</a:t>
             </a:r>
             <a:endParaRPr lang="en-US" dirty="0"/>
@@ -3878,7 +3891,7 @@
           <a:p>
             <a:pPr lvl="0"/>
             <a:r>
-              <a:rPr lang="en-US" smtClean="0"/>
+              <a:rPr lang="en-US"/>
               <a:t>Edit Master text styles</a:t>
             </a:r>
           </a:p>
@@ -3901,7 +3914,7 @@
           <a:p>
             <a:fld id="{FF632088-7E42-4B13-8645-6CA4616862AF}" type="datetimeFigureOut">
               <a:rPr lang="en-US" smtClean="0"/>
-              <a:t>2/23/2016</a:t>
+              <a:t>2/28/2016</a:t>
             </a:fld>
             <a:endParaRPr lang="en-US"/>
           </a:p>
@@ -3995,7 +4008,7 @@
           <a:lstStyle/>
           <a:p>
             <a:r>
-              <a:rPr lang="en-US" smtClean="0"/>
+              <a:rPr lang="en-US"/>
               <a:t>Click to edit Master title style</a:t>
             </a:r>
             <a:endParaRPr lang="en-US" dirty="0"/>
@@ -4024,35 +4037,35 @@
           <a:p>
             <a:pPr lvl="0"/>
             <a:r>
-              <a:rPr lang="en-US" smtClean="0"/>
+              <a:rPr lang="en-US"/>
               <a:t>Edit Master text styles</a:t>
             </a:r>
           </a:p>
           <a:p>
             <a:pPr lvl="1"/>
             <a:r>
-              <a:rPr lang="en-US" smtClean="0"/>
+              <a:rPr lang="en-US"/>
               <a:t>Second level</a:t>
             </a:r>
           </a:p>
           <a:p>
             <a:pPr lvl="2"/>
             <a:r>
-              <a:rPr lang="en-US" smtClean="0"/>
+              <a:rPr lang="en-US"/>
               <a:t>Third level</a:t>
             </a:r>
           </a:p>
           <a:p>
             <a:pPr lvl="3"/>
             <a:r>
-              <a:rPr lang="en-US" smtClean="0"/>
+              <a:rPr lang="en-US"/>
               <a:t>Fourth level</a:t>
             </a:r>
           </a:p>
           <a:p>
             <a:pPr lvl="4"/>
             <a:r>
-              <a:rPr lang="en-US" smtClean="0"/>
+              <a:rPr lang="en-US"/>
               <a:t>Fifth level</a:t>
             </a:r>
             <a:endParaRPr lang="en-US" dirty="0"/>
@@ -4081,35 +4094,35 @@
           <a:p>
             <a:pPr lvl="0"/>
             <a:r>
-              <a:rPr lang="en-US" smtClean="0"/>
+              <a:rPr lang="en-US"/>
               <a:t>Edit Master text styles</a:t>
             </a:r>
           </a:p>
           <a:p>
             <a:pPr lvl="1"/>
             <a:r>
-              <a:rPr lang="en-US" smtClean="0"/>
+              <a:rPr lang="en-US"/>
               <a:t>Second level</a:t>
             </a:r>
           </a:p>
           <a:p>
             <a:pPr lvl="2"/>
             <a:r>
-              <a:rPr lang="en-US" smtClean="0"/>
+              <a:rPr lang="en-US"/>
               <a:t>Third level</a:t>
             </a:r>
           </a:p>
           <a:p>
             <a:pPr lvl="3"/>
             <a:r>
-              <a:rPr lang="en-US" smtClean="0"/>
+              <a:rPr lang="en-US"/>
               <a:t>Fourth level</a:t>
             </a:r>
           </a:p>
           <a:p>
             <a:pPr lvl="4"/>
             <a:r>
-              <a:rPr lang="en-US" smtClean="0"/>
+              <a:rPr lang="en-US"/>
               <a:t>Fifth level</a:t>
             </a:r>
             <a:endParaRPr lang="en-US" dirty="0"/>
@@ -4133,7 +4146,7 @@
           <a:p>
             <a:fld id="{FF632088-7E42-4B13-8645-6CA4616862AF}" type="datetimeFigureOut">
               <a:rPr lang="en-US" smtClean="0"/>
-              <a:t>2/23/2016</a:t>
+              <a:t>2/28/2016</a:t>
             </a:fld>
             <a:endParaRPr lang="en-US"/>
           </a:p>
@@ -4193,7 +4206,7 @@
   </p:clrMapOvr>
   <p:extLst>
     <p:ext uri="{DCECCB84-F9BA-43D5-87BE-67443E8EF086}">
-      <p15:sldGuideLst xmlns="" xmlns:p15="http://schemas.microsoft.com/office/powerpoint/2012/main"/>
+      <p15:sldGuideLst xmlns:p15="http://schemas.microsoft.com/office/powerpoint/2012/main"/>
     </p:ext>
   </p:extLst>
 </p:sldLayout>
@@ -4280,7 +4293,7 @@
           <a:p>
             <a:pPr lvl="0"/>
             <a:r>
-              <a:rPr lang="en-US" smtClean="0"/>
+              <a:rPr lang="en-US"/>
               <a:t>Edit Master text styles</a:t>
             </a:r>
           </a:p>
@@ -4308,35 +4321,35 @@
           <a:p>
             <a:pPr lvl="0"/>
             <a:r>
-              <a:rPr lang="en-US" smtClean="0"/>
+              <a:rPr lang="en-US"/>
               <a:t>Edit Master text styles</a:t>
             </a:r>
           </a:p>
           <a:p>
             <a:pPr lvl="1"/>
             <a:r>
-              <a:rPr lang="en-US" smtClean="0"/>
+              <a:rPr lang="en-US"/>
               <a:t>Second level</a:t>
             </a:r>
           </a:p>
           <a:p>
             <a:pPr lvl="2"/>
             <a:r>
-              <a:rPr lang="en-US" smtClean="0"/>
+              <a:rPr lang="en-US"/>
               <a:t>Third level</a:t>
             </a:r>
           </a:p>
           <a:p>
             <a:pPr lvl="3"/>
             <a:r>
-              <a:rPr lang="en-US" smtClean="0"/>
+              <a:rPr lang="en-US"/>
               <a:t>Fourth level</a:t>
             </a:r>
           </a:p>
           <a:p>
             <a:pPr lvl="4"/>
             <a:r>
-              <a:rPr lang="en-US" smtClean="0"/>
+              <a:rPr lang="en-US"/>
               <a:t>Fifth level</a:t>
             </a:r>
             <a:endParaRPr lang="en-US" dirty="0"/>
@@ -4405,7 +4418,7 @@
           <a:p>
             <a:pPr lvl="0"/>
             <a:r>
-              <a:rPr lang="en-US" smtClean="0"/>
+              <a:rPr lang="en-US"/>
               <a:t>Edit Master text styles</a:t>
             </a:r>
           </a:p>
@@ -4433,38 +4446,37 @@
           <a:p>
             <a:pPr lvl="0"/>
             <a:r>
-              <a:rPr lang="en-US" smtClean="0"/>
+              <a:rPr lang="en-US"/>
               <a:t>Edit Master text styles</a:t>
             </a:r>
           </a:p>
           <a:p>
             <a:pPr lvl="1"/>
             <a:r>
-              <a:rPr lang="en-US" smtClean="0"/>
+              <a:rPr lang="en-US"/>
               <a:t>Second level</a:t>
             </a:r>
           </a:p>
           <a:p>
             <a:pPr lvl="2"/>
             <a:r>
-              <a:rPr lang="en-US" smtClean="0"/>
+              <a:rPr lang="en-US"/>
               <a:t>Third level</a:t>
             </a:r>
           </a:p>
           <a:p>
             <a:pPr lvl="3"/>
             <a:r>
-              <a:rPr lang="en-US" smtClean="0"/>
+              <a:rPr lang="en-US"/>
               <a:t>Fourth level</a:t>
             </a:r>
           </a:p>
           <a:p>
             <a:pPr lvl="4"/>
             <a:r>
-              <a:rPr lang="en-US" smtClean="0"/>
+              <a:rPr lang="en-US"/>
               <a:t>Fifth level</a:t>
             </a:r>
-            <a:endParaRPr lang="en-US"/>
           </a:p>
         </p:txBody>
       </p:sp>
@@ -4485,7 +4497,7 @@
           <a:p>
             <a:fld id="{FF632088-7E42-4B13-8645-6CA4616862AF}" type="datetimeFigureOut">
               <a:rPr lang="en-US" smtClean="0"/>
-              <a:t>2/23/2016</a:t>
+              <a:t>2/28/2016</a:t>
             </a:fld>
             <a:endParaRPr lang="en-US"/>
           </a:p>
@@ -4549,7 +4561,7 @@
           <a:lstStyle/>
           <a:p>
             <a:r>
-              <a:rPr lang="en-US" smtClean="0"/>
+              <a:rPr lang="en-US"/>
               <a:t>Click to edit Master title style</a:t>
             </a:r>
             <a:endParaRPr lang="en-US" dirty="0"/>
@@ -4568,7 +4580,7 @@
   </p:clrMapOvr>
   <p:extLst>
     <p:ext uri="{DCECCB84-F9BA-43D5-87BE-67443E8EF086}">
-      <p15:sldGuideLst xmlns="" xmlns:p15="http://schemas.microsoft.com/office/powerpoint/2012/main"/>
+      <p15:sldGuideLst xmlns:p15="http://schemas.microsoft.com/office/powerpoint/2012/main"/>
     </p:ext>
   </p:extLst>
 </p:sldLayout>
@@ -4608,7 +4620,7 @@
           <a:p>
             <a:fld id="{FF632088-7E42-4B13-8645-6CA4616862AF}" type="datetimeFigureOut">
               <a:rPr lang="en-US" smtClean="0"/>
-              <a:t>2/23/2016</a:t>
+              <a:t>2/28/2016</a:t>
             </a:fld>
             <a:endParaRPr lang="en-US"/>
           </a:p>
@@ -4672,10 +4684,9 @@
           <a:lstStyle/>
           <a:p>
             <a:r>
-              <a:rPr lang="en-US" smtClean="0"/>
+              <a:rPr lang="en-US"/>
               <a:t>Click to edit Master title style</a:t>
             </a:r>
-            <a:endParaRPr lang="en-US"/>
           </a:p>
         </p:txBody>
       </p:sp>
@@ -4726,7 +4737,7 @@
           <a:p>
             <a:fld id="{FF632088-7E42-4B13-8645-6CA4616862AF}" type="datetimeFigureOut">
               <a:rPr lang="en-US" smtClean="0"/>
-              <a:t>2/23/2016</a:t>
+              <a:t>2/28/2016</a:t>
             </a:fld>
             <a:endParaRPr lang="en-US"/>
           </a:p>
@@ -4831,7 +4842,7 @@
           </a:lstStyle>
           <a:p>
             <a:r>
-              <a:rPr lang="en-US" smtClean="0"/>
+              <a:rPr lang="en-US"/>
               <a:t>Click to edit Master title style</a:t>
             </a:r>
             <a:endParaRPr lang="en-US" dirty="0"/>
@@ -4888,35 +4899,35 @@
           <a:p>
             <a:pPr lvl="0"/>
             <a:r>
-              <a:rPr lang="en-US" smtClean="0"/>
+              <a:rPr lang="en-US"/>
               <a:t>Edit Master text styles</a:t>
             </a:r>
           </a:p>
           <a:p>
             <a:pPr lvl="1"/>
             <a:r>
-              <a:rPr lang="en-US" smtClean="0"/>
+              <a:rPr lang="en-US"/>
               <a:t>Second level</a:t>
             </a:r>
           </a:p>
           <a:p>
             <a:pPr lvl="2"/>
             <a:r>
-              <a:rPr lang="en-US" smtClean="0"/>
+              <a:rPr lang="en-US"/>
               <a:t>Third level</a:t>
             </a:r>
           </a:p>
           <a:p>
             <a:pPr lvl="3"/>
             <a:r>
-              <a:rPr lang="en-US" smtClean="0"/>
+              <a:rPr lang="en-US"/>
               <a:t>Fourth level</a:t>
             </a:r>
           </a:p>
           <a:p>
             <a:pPr lvl="4"/>
             <a:r>
-              <a:rPr lang="en-US" smtClean="0"/>
+              <a:rPr lang="en-US"/>
               <a:t>Fifth level</a:t>
             </a:r>
             <a:endParaRPr lang="en-US" dirty="0"/>
@@ -4987,7 +4998,7 @@
           <a:p>
             <a:pPr lvl="0"/>
             <a:r>
-              <a:rPr lang="en-US" smtClean="0"/>
+              <a:rPr lang="en-US"/>
               <a:t>Edit Master text styles</a:t>
             </a:r>
           </a:p>
@@ -5010,7 +5021,7 @@
           <a:p>
             <a:fld id="{FF632088-7E42-4B13-8645-6CA4616862AF}" type="datetimeFigureOut">
               <a:rPr lang="en-US" smtClean="0"/>
-              <a:t>2/23/2016</a:t>
+              <a:t>2/28/2016</a:t>
             </a:fld>
             <a:endParaRPr lang="en-US"/>
           </a:p>
@@ -5070,7 +5081,7 @@
   </p:clrMapOvr>
   <p:extLst>
     <p:ext uri="{DCECCB84-F9BA-43D5-87BE-67443E8EF086}">
-      <p15:sldGuideLst xmlns="" xmlns:p15="http://schemas.microsoft.com/office/powerpoint/2012/main"/>
+      <p15:sldGuideLst xmlns:p15="http://schemas.microsoft.com/office/powerpoint/2012/main"/>
     </p:ext>
   </p:extLst>
 </p:sldLayout>
@@ -5120,7 +5131,7 @@
           </a:lstStyle>
           <a:p>
             <a:r>
-              <a:rPr lang="en-US" smtClean="0"/>
+              <a:rPr lang="en-US"/>
               <a:t>Click to edit Master title style</a:t>
             </a:r>
             <a:endParaRPr lang="en-US" dirty="0"/>
@@ -5185,7 +5196,7 @@
           </a:lstStyle>
           <a:p>
             <a:r>
-              <a:rPr lang="en-US" smtClean="0"/>
+              <a:rPr lang="en-US"/>
               <a:t>Click icon to add picture</a:t>
             </a:r>
             <a:endParaRPr lang="en-US" dirty="0"/>
@@ -5256,7 +5267,7 @@
           <a:p>
             <a:pPr lvl="0"/>
             <a:r>
-              <a:rPr lang="en-US" smtClean="0"/>
+              <a:rPr lang="en-US"/>
               <a:t>Edit Master text styles</a:t>
             </a:r>
           </a:p>
@@ -5279,7 +5290,7 @@
           <a:p>
             <a:fld id="{FF632088-7E42-4B13-8645-6CA4616862AF}" type="datetimeFigureOut">
               <a:rPr lang="en-US" smtClean="0"/>
-              <a:t>2/23/2016</a:t>
+              <a:t>2/28/2016</a:t>
             </a:fld>
             <a:endParaRPr lang="en-US"/>
           </a:p>
@@ -5388,7 +5399,7 @@
           <a:lstStyle/>
           <a:p>
             <a:r>
-              <a:rPr lang="en-US" smtClean="0"/>
+              <a:rPr lang="en-US"/>
               <a:t>Click to edit Master title style</a:t>
             </a:r>
             <a:endParaRPr lang="en-US" dirty="0"/>
@@ -5422,35 +5433,35 @@
           <a:p>
             <a:pPr lvl="0"/>
             <a:r>
-              <a:rPr lang="en-US" smtClean="0"/>
+              <a:rPr lang="en-US"/>
               <a:t>Edit Master text styles</a:t>
             </a:r>
           </a:p>
           <a:p>
             <a:pPr lvl="1"/>
             <a:r>
-              <a:rPr lang="en-US" smtClean="0"/>
+              <a:rPr lang="en-US"/>
               <a:t>Second level</a:t>
             </a:r>
           </a:p>
           <a:p>
             <a:pPr lvl="2"/>
             <a:r>
-              <a:rPr lang="en-US" smtClean="0"/>
+              <a:rPr lang="en-US"/>
               <a:t>Third level</a:t>
             </a:r>
           </a:p>
           <a:p>
             <a:pPr lvl="3"/>
             <a:r>
-              <a:rPr lang="en-US" smtClean="0"/>
+              <a:rPr lang="en-US"/>
               <a:t>Fourth level</a:t>
             </a:r>
           </a:p>
           <a:p>
             <a:pPr lvl="4"/>
             <a:r>
-              <a:rPr lang="en-US" smtClean="0"/>
+              <a:rPr lang="en-US"/>
               <a:t>Fifth level</a:t>
             </a:r>
             <a:endParaRPr lang="en-US" dirty="0"/>
@@ -5493,7 +5504,7 @@
           <a:p>
             <a:fld id="{FF632088-7E42-4B13-8645-6CA4616862AF}" type="datetimeFigureOut">
               <a:rPr lang="en-US" smtClean="0"/>
-              <a:t>2/23/2016</a:t>
+              <a:t>2/28/2016</a:t>
             </a:fld>
             <a:endParaRPr lang="en-US"/>
           </a:p>
@@ -5869,7 +5880,7 @@
   </p:txStyles>
   <p:extLst>
     <p:ext uri="{27BBF7A9-308A-43DC-89C8-2F10F3537804}">
-      <p15:sldGuideLst xmlns="" xmlns:p15="http://schemas.microsoft.com/office/powerpoint/2012/main"/>
+      <p15:sldGuideLst xmlns:p15="http://schemas.microsoft.com/office/powerpoint/2012/main"/>
     </p:ext>
   </p:extLst>
 </p:sldMaster>
@@ -5995,7 +6006,7 @@
           <a:lstStyle/>
           <a:p>
             <a:r>
-              <a:rPr lang="en-US" smtClean="0"/>
+              <a:rPr lang="en-US"/>
               <a:t>Click to edit Master title style</a:t>
             </a:r>
             <a:endParaRPr lang="en-US" dirty="0"/>
@@ -6098,7 +6109,7 @@
           <a:p>
             <a:fld id="{FF632088-7E42-4B13-8645-6CA4616862AF}" type="datetimeFigureOut">
               <a:rPr lang="en-US" smtClean="0"/>
-              <a:t>2/23/2016</a:t>
+              <a:t>2/28/2016</a:t>
             </a:fld>
             <a:endParaRPr lang="en-US"/>
           </a:p>
@@ -6566,7 +6577,7 @@
   </p:txStyles>
   <p:extLst>
     <p:ext uri="{27BBF7A9-308A-43DC-89C8-2F10F3537804}">
-      <p15:sldGuideLst xmlns="" xmlns:p15="http://schemas.microsoft.com/office/powerpoint/2012/main"/>
+      <p15:sldGuideLst xmlns:p15="http://schemas.microsoft.com/office/powerpoint/2012/main"/>
     </p:ext>
   </p:extLst>
 </p:sldMaster>
@@ -6605,10 +6616,9 @@
           <a:lstStyle/>
           <a:p>
             <a:r>
-              <a:rPr lang="en-US" dirty="0" smtClean="0"/>
+              <a:rPr lang="en-US" dirty="0"/>
               <a:t>Product Data</a:t>
             </a:r>
-            <a:endParaRPr lang="en-US" dirty="0"/>
           </a:p>
         </p:txBody>
       </p:sp>
@@ -6628,10 +6638,9 @@
           <a:lstStyle/>
           <a:p>
             <a:r>
-              <a:rPr lang="en-US" smtClean="0"/>
+              <a:rPr lang="en-US"/>
               <a:t>Spyridon Ganas</a:t>
             </a:r>
-            <a:endParaRPr lang="en-US"/>
           </a:p>
         </p:txBody>
       </p:sp>
@@ -6680,7 +6689,10 @@
           <a:bodyPr/>
           <a:lstStyle/>
           <a:p>
-            <a:endParaRPr lang="en-US"/>
+            <a:r>
+              <a:rPr lang="en-US" dirty="0"/>
+              <a:t>What is a Product?</a:t>
+            </a:r>
           </a:p>
         </p:txBody>
       </p:sp>
@@ -6694,12 +6706,64 @@
             <p:ph idx="1"/>
           </p:nvPr>
         </p:nvSpPr>
-        <p:spPr/>
-        <p:txBody>
-          <a:bodyPr/>
-          <a:lstStyle/>
-          <a:p>
-            <a:endParaRPr lang="en-US" dirty="0"/>
+        <p:spPr>
+          <a:xfrm>
+            <a:off x="1534695" y="2015731"/>
+            <a:ext cx="9520159" cy="4609004"/>
+          </a:xfrm>
+        </p:spPr>
+        <p:txBody>
+          <a:bodyPr>
+            <a:normAutofit/>
+          </a:bodyPr>
+          <a:lstStyle/>
+          <a:p>
+            <a:r>
+              <a:rPr lang="en-US" dirty="0"/>
+              <a:t>A product is the set of benefits purchased from a health insurance company.  A product is often described as the combination of:</a:t>
+            </a:r>
+          </a:p>
+          <a:p>
+            <a:pPr lvl="1"/>
+            <a:r>
+              <a:rPr lang="en-US" dirty="0"/>
+              <a:t>Deductibles.</a:t>
+            </a:r>
+          </a:p>
+          <a:p>
+            <a:pPr lvl="1"/>
+            <a:r>
+              <a:rPr lang="en-US" dirty="0"/>
+              <a:t>Co-payments.</a:t>
+            </a:r>
+          </a:p>
+          <a:p>
+            <a:pPr lvl="1"/>
+            <a:r>
+              <a:rPr lang="en-US" dirty="0"/>
+              <a:t>Coinsurance.</a:t>
+            </a:r>
+          </a:p>
+          <a:p>
+            <a:pPr lvl="1"/>
+            <a:r>
+              <a:rPr lang="en-US" dirty="0"/>
+              <a:t>The network of doctors available.</a:t>
+            </a:r>
+          </a:p>
+          <a:p>
+            <a:pPr lvl="1"/>
+            <a:r>
+              <a:rPr lang="en-US" dirty="0"/>
+              <a:t>The medical procedures that are covered.</a:t>
+            </a:r>
+          </a:p>
+          <a:p>
+            <a:pPr lvl="1"/>
+            <a:r>
+              <a:rPr lang="en-US" dirty="0"/>
+              <a:t>Any other feature that impacts the way the policy pays claims, or the way the insurance company markets the policy.</a:t>
+            </a:r>
           </a:p>
         </p:txBody>
       </p:sp>
@@ -6748,7 +6812,10 @@
           <a:bodyPr/>
           <a:lstStyle/>
           <a:p>
-            <a:endParaRPr lang="en-US"/>
+            <a:r>
+              <a:rPr lang="en-US" dirty="0"/>
+              <a:t>Type of Product Information</a:t>
+            </a:r>
           </a:p>
         </p:txBody>
       </p:sp>
@@ -6766,6 +6833,39 @@
         <p:txBody>
           <a:bodyPr/>
           <a:lstStyle/>
+          <a:p>
+            <a:r>
+              <a:rPr lang="en-US" dirty="0"/>
+              <a:t>Carrier License type: HMO, Commercial Carrier, Senior Care Option, etc.</a:t>
+            </a:r>
+          </a:p>
+          <a:p>
+            <a:r>
+              <a:rPr lang="en-US" dirty="0"/>
+              <a:t>Line of Business:  HMO, PPO, POS, Indemnity, Medicare Advantage, etc.</a:t>
+            </a:r>
+          </a:p>
+          <a:p>
+            <a:r>
+              <a:rPr lang="en-US" dirty="0"/>
+              <a:t>Insurance Market: Individual, Health Exchange, Group, Student, etc.</a:t>
+            </a:r>
+          </a:p>
+          <a:p>
+            <a:r>
+              <a:rPr lang="en-US" dirty="0"/>
+              <a:t>Type of Benefit: Medical, Pharmacy, Dental, Vision, etc.</a:t>
+            </a:r>
+          </a:p>
+          <a:p>
+            <a:r>
+              <a:rPr lang="en-US" dirty="0"/>
+              <a:t>Risk Type: Self-Insured, Fully-Insured</a:t>
+            </a:r>
+          </a:p>
+          <a:p>
+            <a:endParaRPr lang="en-US" dirty="0"/>
+          </a:p>
           <a:p>
             <a:endParaRPr lang="en-US" dirty="0"/>
           </a:p>
@@ -6816,7 +6916,10 @@
           <a:bodyPr/>
           <a:lstStyle/>
           <a:p>
-            <a:endParaRPr lang="en-US"/>
+            <a:r>
+              <a:rPr lang="en-US" dirty="0"/>
+              <a:t>Benefits Information</a:t>
+            </a:r>
           </a:p>
         </p:txBody>
       </p:sp>
@@ -6834,6 +6937,39 @@
         <p:txBody>
           <a:bodyPr/>
           <a:lstStyle/>
+          <a:p>
+            <a:r>
+              <a:rPr lang="en-US" dirty="0"/>
+              <a:t>Annual per person deductible</a:t>
+            </a:r>
+          </a:p>
+          <a:p>
+            <a:r>
+              <a:rPr lang="en-US" dirty="0"/>
+              <a:t>Annual per family deductible</a:t>
+            </a:r>
+          </a:p>
+          <a:p>
+            <a:r>
+              <a:rPr lang="en-US" dirty="0"/>
+              <a:t>Doe the insurance policy use a managed care model? (i.e. doe the patient need to select a primary care physician?)</a:t>
+            </a:r>
+          </a:p>
+          <a:p>
+            <a:r>
+              <a:rPr lang="en-US" dirty="0"/>
+              <a:t>Etc.</a:t>
+            </a:r>
+          </a:p>
+          <a:p>
+            <a:endParaRPr lang="en-US" dirty="0"/>
+          </a:p>
+          <a:p>
+            <a:endParaRPr lang="en-US" dirty="0"/>
+          </a:p>
+          <a:p>
+            <a:endParaRPr lang="en-US" dirty="0"/>
+          </a:p>
           <a:p>
             <a:endParaRPr lang="en-US" dirty="0"/>
           </a:p>
@@ -6885,10 +7021,9 @@
           <a:lstStyle/>
           <a:p>
             <a:r>
-              <a:rPr lang="en-US" smtClean="0"/>
+              <a:rPr lang="en-US"/>
               <a:t>References</a:t>
             </a:r>
-            <a:endParaRPr lang="en-US"/>
           </a:p>
         </p:txBody>
       </p:sp>
@@ -6906,6 +7041,15 @@
         <p:txBody>
           <a:bodyPr/>
           <a:lstStyle/>
+          <a:p>
+            <a:r>
+              <a:rPr lang="en-US" dirty="0">
+                <a:hlinkClick r:id="rId2"/>
+              </a:rPr>
+              <a:t>http://www.chiamass.gov/assets/docs/p/apcd/submission-guides/version-5.0/v5-apcd-product-file-submission-guide-FINAL.pdf</a:t>
+            </a:r>
+            <a:endParaRPr lang="en-US" dirty="0"/>
+          </a:p>
           <a:p>
             <a:endParaRPr lang="en-US" dirty="0"/>
           </a:p>
@@ -7424,7 +7568,7 @@
   <a:extraClrSchemeLst/>
   <a:extLst>
     <a:ext uri="{05A4C25C-085E-4340-85A3-A5531E510DB2}">
-      <thm15:themeFamily xmlns="" xmlns:thm15="http://schemas.microsoft.com/office/thememl/2012/main" name="Gallery" id="{BBFCD31E-59A1-489D-B089-A3EAD7CAE12E}" vid="{AC464412-510E-4F2B-8947-A0DDBD028997}"/>
+      <thm15:themeFamily xmlns:thm15="http://schemas.microsoft.com/office/thememl/2012/main" name="Gallery" id="{BBFCD31E-59A1-489D-B089-A3EAD7CAE12E}" vid="{AC464412-510E-4F2B-8947-A0DDBD028997}"/>
     </a:ext>
   </a:extLst>
 </a:theme>

</xml_diff>